<commit_message>
adds todo charts from week04
</commit_message>
<xml_diff>
--- a/Präsentation.pptx
+++ b/Präsentation.pptx
@@ -7490,7 +7490,7 @@
                 <a:ea typeface="+mj-lt"/>
                 <a:cs typeface="+mj-lt"/>
               </a:rPr>
-              <a:t>ist der Input ungültig: wird die Schrift rot und die Eingabe wird nicht gespeichert </a:t>
+              <a:t>ist der Input ungültig: wird die Schrift rot und die Eingabe wird nicht akzeptiert </a:t>
             </a:r>
           </a:p>
           <a:p>
@@ -15973,6 +15973,12 @@
 </file>
 
 <file path=customXml/item1.xml><?xml version="1.0" encoding="utf-8"?>
+<p:properties xmlns:p="http://schemas.microsoft.com/office/2006/metadata/properties" xmlns:xsi="http://www.w3.org/2001/XMLSchema-instance" xmlns:pc="http://schemas.microsoft.com/office/infopath/2007/PartnerControls">
+  <documentManagement/>
+</p:properties>
+</file>
+
+<file path=customXml/item2.xml><?xml version="1.0" encoding="utf-8"?>
 <ct:contentTypeSchema xmlns:ct="http://schemas.microsoft.com/office/2006/metadata/contentType" xmlns:ma="http://schemas.microsoft.com/office/2006/metadata/properties/metaAttributes" ct:_="" ma:_="" ma:contentTypeName="Dokument" ma:contentTypeID="0x010100943AAE68AE503240A7C243B66E570F94" ma:contentTypeVersion="10" ma:contentTypeDescription="Ein neues Dokument erstellen." ma:contentTypeScope="" ma:versionID="e0980f8153d068b4f87d3c7a0be2c197">
   <xsd:schema xmlns:xsd="http://www.w3.org/2001/XMLSchema" xmlns:xs="http://www.w3.org/2001/XMLSchema" xmlns:p="http://schemas.microsoft.com/office/2006/metadata/properties" xmlns:ns2="9f84eab0-ca6f-4451-872e-fe7a778352be" xmlns:ns3="a64ebce3-c1cd-4e70-90f3-f285d77b13e1" targetNamespace="http://schemas.microsoft.com/office/2006/metadata/properties" ma:root="true" ma:fieldsID="834ee858cde1118ac108b1af1a98e8e7" ns2:_="" ns3:_="">
     <xsd:import namespace="9f84eab0-ca6f-4451-872e-fe7a778352be"/>
@@ -16177,12 +16183,6 @@
 </ct:contentTypeSchema>
 </file>
 
-<file path=customXml/item2.xml><?xml version="1.0" encoding="utf-8"?>
-<p:properties xmlns:p="http://schemas.microsoft.com/office/2006/metadata/properties" xmlns:xsi="http://www.w3.org/2001/XMLSchema-instance" xmlns:pc="http://schemas.microsoft.com/office/infopath/2007/PartnerControls">
-  <documentManagement/>
-</p:properties>
-</file>
-
 <file path=customXml/item3.xml><?xml version="1.0" encoding="utf-8"?>
 <?mso-contentType ?>
 <FormTemplates xmlns="http://schemas.microsoft.com/sharepoint/v3/contenttype/forms">
@@ -16193,6 +16193,23 @@
 </file>
 
 <file path=customXml/itemProps1.xml><?xml version="1.0" encoding="utf-8"?>
+<ds:datastoreItem xmlns:ds="http://schemas.openxmlformats.org/officeDocument/2006/customXml" ds:itemID="{D0E39D12-945D-4A33-A53E-E4CA77446FAE}">
+  <ds:schemaRefs>
+    <ds:schemaRef ds:uri="9f84eab0-ca6f-4451-872e-fe7a778352be"/>
+    <ds:schemaRef ds:uri="a64ebce3-c1cd-4e70-90f3-f285d77b13e1"/>
+    <ds:schemaRef ds:uri="http://purl.org/dc/dcmitype/"/>
+    <ds:schemaRef ds:uri="http://purl.org/dc/elements/1.1/"/>
+    <ds:schemaRef ds:uri="http://purl.org/dc/terms/"/>
+    <ds:schemaRef ds:uri="http://schemas.microsoft.com/office/2006/documentManagement/types"/>
+    <ds:schemaRef ds:uri="http://schemas.microsoft.com/office/2006/metadata/properties"/>
+    <ds:schemaRef ds:uri="http://schemas.microsoft.com/office/infopath/2007/PartnerControls"/>
+    <ds:schemaRef ds:uri="http://schemas.openxmlformats.org/package/2006/metadata/core-properties"/>
+    <ds:schemaRef ds:uri="http://www.w3.org/XML/1998/namespace"/>
+  </ds:schemaRefs>
+</ds:datastoreItem>
+</file>
+
+<file path=customXml/itemProps2.xml><?xml version="1.0" encoding="utf-8"?>
 <ds:datastoreItem xmlns:ds="http://schemas.openxmlformats.org/officeDocument/2006/customXml" ds:itemID="{E360BBDE-2952-4585-A3F8-0B297E129571}">
   <ds:schemaRefs>
     <ds:schemaRef ds:uri="9f84eab0-ca6f-4451-872e-fe7a778352be"/>
@@ -16211,23 +16228,6 @@
 </ds:datastoreItem>
 </file>
 
-<file path=customXml/itemProps2.xml><?xml version="1.0" encoding="utf-8"?>
-<ds:datastoreItem xmlns:ds="http://schemas.openxmlformats.org/officeDocument/2006/customXml" ds:itemID="{D0E39D12-945D-4A33-A53E-E4CA77446FAE}">
-  <ds:schemaRefs>
-    <ds:schemaRef ds:uri="9f84eab0-ca6f-4451-872e-fe7a778352be"/>
-    <ds:schemaRef ds:uri="a64ebce3-c1cd-4e70-90f3-f285d77b13e1"/>
-    <ds:schemaRef ds:uri="http://purl.org/dc/dcmitype/"/>
-    <ds:schemaRef ds:uri="http://purl.org/dc/elements/1.1/"/>
-    <ds:schemaRef ds:uri="http://purl.org/dc/terms/"/>
-    <ds:schemaRef ds:uri="http://schemas.microsoft.com/office/2006/documentManagement/types"/>
-    <ds:schemaRef ds:uri="http://schemas.microsoft.com/office/2006/metadata/properties"/>
-    <ds:schemaRef ds:uri="http://schemas.microsoft.com/office/infopath/2007/PartnerControls"/>
-    <ds:schemaRef ds:uri="http://schemas.openxmlformats.org/package/2006/metadata/core-properties"/>
-    <ds:schemaRef ds:uri="http://www.w3.org/XML/1998/namespace"/>
-  </ds:schemaRefs>
-</ds:datastoreItem>
-</file>
-
 <file path=customXml/itemProps3.xml><?xml version="1.0" encoding="utf-8"?>
 <ds:datastoreItem xmlns:ds="http://schemas.openxmlformats.org/officeDocument/2006/customXml" ds:itemID="{C79019B3-D725-4047-9AE5-52857F0EE35F}">
   <ds:schemaRefs>

</xml_diff>